<commit_message>
Inserting buttons as table with two columns
</commit_message>
<xml_diff>
--- a/images/teaching_images.pptx
+++ b/images/teaching_images.pptx
@@ -7,6 +7,7 @@
   <p:sldIdLst>
     <p:sldId id="256" r:id="rId2"/>
     <p:sldId id="257" r:id="rId3"/>
+    <p:sldId id="258" r:id="rId4"/>
   </p:sldIdLst>
   <p:sldSz cx="12192000" cy="6858000"/>
   <p:notesSz cx="6858000" cy="9144000"/>
@@ -3796,7 +3797,7 @@
               <a:rPr lang="en-US" sz="2400" b="1" dirty="0">
                 <a:latin typeface="Bookman Old Style" panose="02050604050505020204" pitchFamily="18" charset="0"/>
               </a:rPr>
-              <a:t>Sample Teaching Rubric</a:t>
+              <a:t>Sample Assessment Rubric</a:t>
             </a:r>
           </a:p>
         </p:txBody>
@@ -4008,10 +4009,819 @@
           </a:p>
         </p:txBody>
       </p:sp>
+      <p:sp>
+        <p:nvSpPr>
+          <p:cNvPr id="11" name="Rounded Rectangle 10">
+            <a:extLst>
+              <a:ext uri="{FF2B5EF4-FFF2-40B4-BE49-F238E27FC236}">
+                <a16:creationId xmlns:a16="http://schemas.microsoft.com/office/drawing/2014/main" id="{870AA118-76DD-894B-96B5-A7393E6DDB3D}"/>
+              </a:ext>
+            </a:extLst>
+          </p:cNvPr>
+          <p:cNvSpPr/>
+          <p:nvPr/>
+        </p:nvSpPr>
+        <p:spPr>
+          <a:xfrm>
+            <a:off x="-2" y="5962650"/>
+            <a:ext cx="6234319" cy="895350"/>
+          </a:xfrm>
+          <a:prstGeom prst="roundRect">
+            <a:avLst/>
+          </a:prstGeom>
+          <a:solidFill>
+            <a:srgbClr val="78A779"/>
+          </a:solidFill>
+          <a:ln>
+            <a:noFill/>
+          </a:ln>
+          <a:effectLst/>
+          <a:scene3d>
+            <a:camera prst="orthographicFront"/>
+            <a:lightRig rig="soft" dir="t"/>
+          </a:scene3d>
+          <a:sp3d extrusionH="82550" contourW="76200" prstMaterial="plastic">
+            <a:bevelT/>
+            <a:bevelB prst="slope"/>
+            <a:contourClr>
+              <a:schemeClr val="bg1"/>
+            </a:contourClr>
+          </a:sp3d>
+        </p:spPr>
+        <p:style>
+          <a:lnRef idx="2">
+            <a:schemeClr val="accent1">
+              <a:shade val="50000"/>
+            </a:schemeClr>
+          </a:lnRef>
+          <a:fillRef idx="1">
+            <a:schemeClr val="accent1"/>
+          </a:fillRef>
+          <a:effectRef idx="0">
+            <a:schemeClr val="accent1"/>
+          </a:effectRef>
+          <a:fontRef idx="minor">
+            <a:schemeClr val="lt1"/>
+          </a:fontRef>
+        </p:style>
+        <p:txBody>
+          <a:bodyPr rtlCol="0" anchor="ctr"/>
+          <a:lstStyle/>
+          <a:p>
+            <a:pPr algn="ctr"/>
+            <a:r>
+              <a:rPr lang="en-US" sz="2400" b="1" dirty="0">
+                <a:latin typeface="Bookman Old Style" panose="02050604050505020204" pitchFamily="18" charset="0"/>
+              </a:rPr>
+              <a:t>Sample Assignment</a:t>
+            </a:r>
+          </a:p>
+        </p:txBody>
+      </p:sp>
     </p:spTree>
     <p:extLst>
       <p:ext uri="{BB962C8B-B14F-4D97-AF65-F5344CB8AC3E}">
         <p14:creationId xmlns:p14="http://schemas.microsoft.com/office/powerpoint/2010/main" val="1469072724"/>
+      </p:ext>
+    </p:extLst>
+  </p:cSld>
+  <p:clrMapOvr>
+    <a:masterClrMapping/>
+  </p:clrMapOvr>
+</p:sld>
+</file>
+
+<file path=ppt/slides/slide3.xml><?xml version="1.0" encoding="utf-8"?>
+<p:sld xmlns:a="http://schemas.openxmlformats.org/drawingml/2006/main" xmlns:r="http://schemas.openxmlformats.org/officeDocument/2006/relationships" xmlns:p="http://schemas.openxmlformats.org/presentationml/2006/main">
+  <p:cSld>
+    <p:spTree>
+      <p:nvGrpSpPr>
+        <p:cNvPr id="1" name=""/>
+        <p:cNvGrpSpPr/>
+        <p:nvPr/>
+      </p:nvGrpSpPr>
+      <p:grpSpPr>
+        <a:xfrm>
+          <a:off x="0" y="0"/>
+          <a:ext cx="0" cy="0"/>
+          <a:chOff x="0" y="0"/>
+          <a:chExt cx="0" cy="0"/>
+        </a:xfrm>
+      </p:grpSpPr>
+      <p:sp>
+        <p:nvSpPr>
+          <p:cNvPr id="2" name="Rounded Rectangle 1">
+            <a:extLst>
+              <a:ext uri="{FF2B5EF4-FFF2-40B4-BE49-F238E27FC236}">
+                <a16:creationId xmlns:a16="http://schemas.microsoft.com/office/drawing/2014/main" id="{7045277D-6283-CD4E-B119-18E7631867BD}"/>
+              </a:ext>
+            </a:extLst>
+          </p:cNvPr>
+          <p:cNvSpPr/>
+          <p:nvPr/>
+        </p:nvSpPr>
+        <p:spPr>
+          <a:xfrm>
+            <a:off x="2955238" y="459235"/>
+            <a:ext cx="6234318" cy="895350"/>
+          </a:xfrm>
+          <a:prstGeom prst="roundRect">
+            <a:avLst/>
+          </a:prstGeom>
+          <a:solidFill>
+            <a:schemeClr val="accent5">
+              <a:lumMod val="50000"/>
+            </a:schemeClr>
+          </a:solidFill>
+          <a:ln>
+            <a:noFill/>
+          </a:ln>
+          <a:effectLst/>
+          <a:scene3d>
+            <a:camera prst="orthographicFront"/>
+            <a:lightRig rig="balanced" dir="t"/>
+          </a:scene3d>
+          <a:sp3d extrusionH="152400" contourW="76200" prstMaterial="plastic">
+            <a:bevelT w="152400" h="152400"/>
+            <a:bevelB w="146050" h="152400" prst="slope"/>
+            <a:contourClr>
+              <a:schemeClr val="bg1"/>
+            </a:contourClr>
+          </a:sp3d>
+        </p:spPr>
+        <p:style>
+          <a:lnRef idx="2">
+            <a:schemeClr val="accent1">
+              <a:shade val="50000"/>
+            </a:schemeClr>
+          </a:lnRef>
+          <a:fillRef idx="1">
+            <a:schemeClr val="accent1"/>
+          </a:fillRef>
+          <a:effectRef idx="0">
+            <a:schemeClr val="accent1"/>
+          </a:effectRef>
+          <a:fontRef idx="minor">
+            <a:schemeClr val="lt1"/>
+          </a:fontRef>
+        </p:style>
+        <p:txBody>
+          <a:bodyPr rtlCol="0" anchor="ctr"/>
+          <a:lstStyle/>
+          <a:p>
+            <a:pPr algn="ctr"/>
+            <a:r>
+              <a:rPr lang="en-US" sz="2400" b="1" dirty="0">
+                <a:latin typeface="Bookman Old Style" panose="02050604050505020204" pitchFamily="18" charset="0"/>
+              </a:rPr>
+              <a:t>La Salle Teaching Award</a:t>
+            </a:r>
+          </a:p>
+        </p:txBody>
+      </p:sp>
+      <p:sp>
+        <p:nvSpPr>
+          <p:cNvPr id="3" name="Rounded Rectangle 2">
+            <a:extLst>
+              <a:ext uri="{FF2B5EF4-FFF2-40B4-BE49-F238E27FC236}">
+                <a16:creationId xmlns:a16="http://schemas.microsoft.com/office/drawing/2014/main" id="{0C73FB99-7074-7542-8DE9-98535F6163D5}"/>
+              </a:ext>
+            </a:extLst>
+          </p:cNvPr>
+          <p:cNvSpPr/>
+          <p:nvPr/>
+        </p:nvSpPr>
+        <p:spPr>
+          <a:xfrm>
+            <a:off x="2" y="1555600"/>
+            <a:ext cx="6234319" cy="895350"/>
+          </a:xfrm>
+          <a:prstGeom prst="roundRect">
+            <a:avLst/>
+          </a:prstGeom>
+          <a:solidFill>
+            <a:schemeClr val="accent5">
+              <a:lumMod val="50000"/>
+            </a:schemeClr>
+          </a:solidFill>
+          <a:ln>
+            <a:noFill/>
+          </a:ln>
+          <a:effectLst/>
+          <a:scene3d>
+            <a:camera prst="orthographicFront"/>
+            <a:lightRig rig="balanced" dir="t"/>
+          </a:scene3d>
+          <a:sp3d extrusionH="152400" contourW="76200" prstMaterial="plastic">
+            <a:bevelT w="152400" h="152400"/>
+            <a:bevelB w="146050" h="152400" prst="slope"/>
+            <a:contourClr>
+              <a:schemeClr val="bg1"/>
+            </a:contourClr>
+          </a:sp3d>
+        </p:spPr>
+        <p:style>
+          <a:lnRef idx="2">
+            <a:schemeClr val="accent1">
+              <a:shade val="50000"/>
+            </a:schemeClr>
+          </a:lnRef>
+          <a:fillRef idx="1">
+            <a:schemeClr val="accent1"/>
+          </a:fillRef>
+          <a:effectRef idx="0">
+            <a:schemeClr val="accent1"/>
+          </a:effectRef>
+          <a:fontRef idx="minor">
+            <a:schemeClr val="lt1"/>
+          </a:fontRef>
+        </p:style>
+        <p:txBody>
+          <a:bodyPr rtlCol="0" anchor="ctr"/>
+          <a:lstStyle/>
+          <a:p>
+            <a:pPr algn="ctr"/>
+            <a:r>
+              <a:rPr lang="en-US" sz="2400" b="1" dirty="0">
+                <a:latin typeface="Bookman Old Style" panose="02050604050505020204" pitchFamily="18" charset="0"/>
+              </a:rPr>
+              <a:t>Sample Syllabus</a:t>
+            </a:r>
+          </a:p>
+        </p:txBody>
+      </p:sp>
+      <p:sp>
+        <p:nvSpPr>
+          <p:cNvPr id="4" name="Rounded Rectangle 3">
+            <a:extLst>
+              <a:ext uri="{FF2B5EF4-FFF2-40B4-BE49-F238E27FC236}">
+                <a16:creationId xmlns:a16="http://schemas.microsoft.com/office/drawing/2014/main" id="{ECA4CF57-5DEB-3F46-9724-D5D572FA6FC3}"/>
+              </a:ext>
+            </a:extLst>
+          </p:cNvPr>
+          <p:cNvSpPr/>
+          <p:nvPr/>
+        </p:nvSpPr>
+        <p:spPr>
+          <a:xfrm>
+            <a:off x="6355245" y="1554070"/>
+            <a:ext cx="6234319" cy="895350"/>
+          </a:xfrm>
+          <a:prstGeom prst="roundRect">
+            <a:avLst/>
+          </a:prstGeom>
+          <a:solidFill>
+            <a:schemeClr val="accent5">
+              <a:lumMod val="50000"/>
+            </a:schemeClr>
+          </a:solidFill>
+          <a:ln>
+            <a:noFill/>
+          </a:ln>
+          <a:effectLst/>
+          <a:scene3d>
+            <a:camera prst="orthographicFront"/>
+            <a:lightRig rig="balanced" dir="t"/>
+          </a:scene3d>
+          <a:sp3d extrusionH="152400" contourW="76200" prstMaterial="plastic">
+            <a:bevelT w="152400" h="152400"/>
+            <a:bevelB w="146050" h="152400" prst="slope"/>
+            <a:contourClr>
+              <a:schemeClr val="bg1"/>
+            </a:contourClr>
+          </a:sp3d>
+        </p:spPr>
+        <p:style>
+          <a:lnRef idx="2">
+            <a:schemeClr val="accent1">
+              <a:shade val="50000"/>
+            </a:schemeClr>
+          </a:lnRef>
+          <a:fillRef idx="1">
+            <a:schemeClr val="accent1"/>
+          </a:fillRef>
+          <a:effectRef idx="0">
+            <a:schemeClr val="accent1"/>
+          </a:effectRef>
+          <a:fontRef idx="minor">
+            <a:schemeClr val="lt1"/>
+          </a:fontRef>
+        </p:style>
+        <p:txBody>
+          <a:bodyPr rtlCol="0" anchor="ctr"/>
+          <a:lstStyle/>
+          <a:p>
+            <a:pPr algn="ctr"/>
+            <a:r>
+              <a:rPr lang="en-US" sz="2400" b="1" dirty="0">
+                <a:latin typeface="Bookman Old Style" panose="02050604050505020204" pitchFamily="18" charset="0"/>
+              </a:rPr>
+              <a:t>Teaching Sample (Video)</a:t>
+            </a:r>
+          </a:p>
+        </p:txBody>
+      </p:sp>
+      <p:sp>
+        <p:nvSpPr>
+          <p:cNvPr id="5" name="Rounded Rectangle 4">
+            <a:extLst>
+              <a:ext uri="{FF2B5EF4-FFF2-40B4-BE49-F238E27FC236}">
+                <a16:creationId xmlns:a16="http://schemas.microsoft.com/office/drawing/2014/main" id="{372C7A05-DE50-094F-AA1D-AB8F12C472F9}"/>
+              </a:ext>
+            </a:extLst>
+          </p:cNvPr>
+          <p:cNvSpPr/>
+          <p:nvPr/>
+        </p:nvSpPr>
+        <p:spPr>
+          <a:xfrm>
+            <a:off x="1" y="2624759"/>
+            <a:ext cx="6234319" cy="895350"/>
+          </a:xfrm>
+          <a:prstGeom prst="roundRect">
+            <a:avLst/>
+          </a:prstGeom>
+          <a:solidFill>
+            <a:schemeClr val="accent5">
+              <a:lumMod val="50000"/>
+            </a:schemeClr>
+          </a:solidFill>
+          <a:ln>
+            <a:noFill/>
+          </a:ln>
+          <a:effectLst/>
+          <a:scene3d>
+            <a:camera prst="orthographicFront"/>
+            <a:lightRig rig="balanced" dir="t"/>
+          </a:scene3d>
+          <a:sp3d extrusionH="152400" contourW="76200" prstMaterial="plastic">
+            <a:bevelT w="152400" h="152400"/>
+            <a:bevelB w="146050" h="152400" prst="slope"/>
+            <a:contourClr>
+              <a:schemeClr val="bg1"/>
+            </a:contourClr>
+          </a:sp3d>
+        </p:spPr>
+        <p:style>
+          <a:lnRef idx="2">
+            <a:schemeClr val="accent1">
+              <a:shade val="50000"/>
+            </a:schemeClr>
+          </a:lnRef>
+          <a:fillRef idx="1">
+            <a:schemeClr val="accent1"/>
+          </a:fillRef>
+          <a:effectRef idx="0">
+            <a:schemeClr val="accent1"/>
+          </a:effectRef>
+          <a:fontRef idx="minor">
+            <a:schemeClr val="lt1"/>
+          </a:fontRef>
+        </p:style>
+        <p:txBody>
+          <a:bodyPr rtlCol="0" anchor="ctr"/>
+          <a:lstStyle/>
+          <a:p>
+            <a:pPr algn="ctr"/>
+            <a:r>
+              <a:rPr lang="en-US" sz="2400" b="1" dirty="0">
+                <a:latin typeface="Bookman Old Style" panose="02050604050505020204" pitchFamily="18" charset="0"/>
+              </a:rPr>
+              <a:t>Sample Lesson Plan</a:t>
+            </a:r>
+          </a:p>
+        </p:txBody>
+      </p:sp>
+      <p:sp>
+        <p:nvSpPr>
+          <p:cNvPr id="6" name="Rounded Rectangle 5">
+            <a:extLst>
+              <a:ext uri="{FF2B5EF4-FFF2-40B4-BE49-F238E27FC236}">
+                <a16:creationId xmlns:a16="http://schemas.microsoft.com/office/drawing/2014/main" id="{D9E62570-D51E-DF46-8B44-DF0BAB4E3470}"/>
+              </a:ext>
+            </a:extLst>
+          </p:cNvPr>
+          <p:cNvSpPr/>
+          <p:nvPr/>
+        </p:nvSpPr>
+        <p:spPr>
+          <a:xfrm>
+            <a:off x="-1" y="3741219"/>
+            <a:ext cx="6234319" cy="895350"/>
+          </a:xfrm>
+          <a:prstGeom prst="roundRect">
+            <a:avLst/>
+          </a:prstGeom>
+          <a:solidFill>
+            <a:schemeClr val="accent5">
+              <a:lumMod val="50000"/>
+            </a:schemeClr>
+          </a:solidFill>
+          <a:ln>
+            <a:noFill/>
+          </a:ln>
+          <a:effectLst/>
+          <a:scene3d>
+            <a:camera prst="orthographicFront"/>
+            <a:lightRig rig="balanced" dir="t"/>
+          </a:scene3d>
+          <a:sp3d extrusionH="152400" contourW="76200" prstMaterial="plastic">
+            <a:bevelT w="152400" h="152400"/>
+            <a:bevelB w="146050" h="152400" prst="slope"/>
+            <a:contourClr>
+              <a:schemeClr val="bg1"/>
+            </a:contourClr>
+          </a:sp3d>
+        </p:spPr>
+        <p:style>
+          <a:lnRef idx="2">
+            <a:schemeClr val="accent1">
+              <a:shade val="50000"/>
+            </a:schemeClr>
+          </a:lnRef>
+          <a:fillRef idx="1">
+            <a:schemeClr val="accent1"/>
+          </a:fillRef>
+          <a:effectRef idx="0">
+            <a:schemeClr val="accent1"/>
+          </a:effectRef>
+          <a:fontRef idx="minor">
+            <a:schemeClr val="lt1"/>
+          </a:fontRef>
+        </p:style>
+        <p:txBody>
+          <a:bodyPr rtlCol="0" anchor="ctr"/>
+          <a:lstStyle/>
+          <a:p>
+            <a:pPr algn="ctr"/>
+            <a:r>
+              <a:rPr lang="en-US" sz="2400" b="1" dirty="0">
+                <a:latin typeface="Bookman Old Style" panose="02050604050505020204" pitchFamily="18" charset="0"/>
+              </a:rPr>
+              <a:t>Sample Assignment Feedback </a:t>
+            </a:r>
+          </a:p>
+        </p:txBody>
+      </p:sp>
+      <p:sp>
+        <p:nvSpPr>
+          <p:cNvPr id="7" name="Rounded Rectangle 6">
+            <a:extLst>
+              <a:ext uri="{FF2B5EF4-FFF2-40B4-BE49-F238E27FC236}">
+                <a16:creationId xmlns:a16="http://schemas.microsoft.com/office/drawing/2014/main" id="{542DDDEF-4997-9840-AABA-1C8FA05A5AC3}"/>
+              </a:ext>
+            </a:extLst>
+          </p:cNvPr>
+          <p:cNvSpPr/>
+          <p:nvPr/>
+        </p:nvSpPr>
+        <p:spPr>
+          <a:xfrm>
+            <a:off x="0" y="4811368"/>
+            <a:ext cx="6234319" cy="895350"/>
+          </a:xfrm>
+          <a:prstGeom prst="roundRect">
+            <a:avLst/>
+          </a:prstGeom>
+          <a:solidFill>
+            <a:schemeClr val="accent5">
+              <a:lumMod val="50000"/>
+            </a:schemeClr>
+          </a:solidFill>
+          <a:ln>
+            <a:noFill/>
+          </a:ln>
+          <a:effectLst/>
+          <a:scene3d>
+            <a:camera prst="orthographicFront"/>
+            <a:lightRig rig="balanced" dir="t"/>
+          </a:scene3d>
+          <a:sp3d extrusionH="152400" contourW="76200" prstMaterial="plastic">
+            <a:bevelT w="152400" h="152400"/>
+            <a:bevelB w="146050" h="152400" prst="slope"/>
+            <a:contourClr>
+              <a:schemeClr val="bg1"/>
+            </a:contourClr>
+          </a:sp3d>
+        </p:spPr>
+        <p:style>
+          <a:lnRef idx="2">
+            <a:schemeClr val="accent1">
+              <a:shade val="50000"/>
+            </a:schemeClr>
+          </a:lnRef>
+          <a:fillRef idx="1">
+            <a:schemeClr val="accent1"/>
+          </a:fillRef>
+          <a:effectRef idx="0">
+            <a:schemeClr val="accent1"/>
+          </a:effectRef>
+          <a:fontRef idx="minor">
+            <a:schemeClr val="lt1"/>
+          </a:fontRef>
+        </p:style>
+        <p:txBody>
+          <a:bodyPr rtlCol="0" anchor="ctr"/>
+          <a:lstStyle/>
+          <a:p>
+            <a:pPr algn="ctr"/>
+            <a:r>
+              <a:rPr lang="en-US" sz="2400" b="1" dirty="0">
+                <a:latin typeface="Bookman Old Style" panose="02050604050505020204" pitchFamily="18" charset="0"/>
+              </a:rPr>
+              <a:t>Sample Assessment Rubric</a:t>
+            </a:r>
+          </a:p>
+        </p:txBody>
+      </p:sp>
+      <p:sp>
+        <p:nvSpPr>
+          <p:cNvPr id="8" name="Rounded Rectangle 7">
+            <a:extLst>
+              <a:ext uri="{FF2B5EF4-FFF2-40B4-BE49-F238E27FC236}">
+                <a16:creationId xmlns:a16="http://schemas.microsoft.com/office/drawing/2014/main" id="{2CF3EBE6-AB75-3344-B3D1-3AEFE518F373}"/>
+              </a:ext>
+            </a:extLst>
+          </p:cNvPr>
+          <p:cNvSpPr/>
+          <p:nvPr/>
+        </p:nvSpPr>
+        <p:spPr>
+          <a:xfrm>
+            <a:off x="6355246" y="2673050"/>
+            <a:ext cx="6234319" cy="895350"/>
+          </a:xfrm>
+          <a:prstGeom prst="roundRect">
+            <a:avLst/>
+          </a:prstGeom>
+          <a:solidFill>
+            <a:schemeClr val="accent5">
+              <a:lumMod val="50000"/>
+            </a:schemeClr>
+          </a:solidFill>
+          <a:ln>
+            <a:noFill/>
+          </a:ln>
+          <a:effectLst/>
+          <a:scene3d>
+            <a:camera prst="orthographicFront"/>
+            <a:lightRig rig="balanced" dir="t"/>
+          </a:scene3d>
+          <a:sp3d extrusionH="152400" contourW="76200" prstMaterial="plastic">
+            <a:bevelT w="152400" h="152400"/>
+            <a:bevelB w="146050" h="152400" prst="slope"/>
+            <a:contourClr>
+              <a:schemeClr val="bg1"/>
+            </a:contourClr>
+          </a:sp3d>
+        </p:spPr>
+        <p:style>
+          <a:lnRef idx="2">
+            <a:schemeClr val="accent1">
+              <a:shade val="50000"/>
+            </a:schemeClr>
+          </a:lnRef>
+          <a:fillRef idx="1">
+            <a:schemeClr val="accent1"/>
+          </a:fillRef>
+          <a:effectRef idx="0">
+            <a:schemeClr val="accent1"/>
+          </a:effectRef>
+          <a:fontRef idx="minor">
+            <a:schemeClr val="lt1"/>
+          </a:fontRef>
+        </p:style>
+        <p:txBody>
+          <a:bodyPr rtlCol="0" anchor="ctr"/>
+          <a:lstStyle/>
+          <a:p>
+            <a:pPr algn="ctr"/>
+            <a:r>
+              <a:rPr lang="en-US" sz="2400" b="1" dirty="0">
+                <a:latin typeface="Bookman Old Style" panose="02050604050505020204" pitchFamily="18" charset="0"/>
+              </a:rPr>
+              <a:t>Student Feedback – MIS 111</a:t>
+            </a:r>
+          </a:p>
+        </p:txBody>
+      </p:sp>
+      <p:sp>
+        <p:nvSpPr>
+          <p:cNvPr id="9" name="Rounded Rectangle 8">
+            <a:extLst>
+              <a:ext uri="{FF2B5EF4-FFF2-40B4-BE49-F238E27FC236}">
+                <a16:creationId xmlns:a16="http://schemas.microsoft.com/office/drawing/2014/main" id="{3DB02658-814B-314E-9A70-FE7D335BD20D}"/>
+              </a:ext>
+            </a:extLst>
+          </p:cNvPr>
+          <p:cNvSpPr/>
+          <p:nvPr/>
+        </p:nvSpPr>
+        <p:spPr>
+          <a:xfrm>
+            <a:off x="6355245" y="3669862"/>
+            <a:ext cx="6234319" cy="895350"/>
+          </a:xfrm>
+          <a:prstGeom prst="roundRect">
+            <a:avLst/>
+          </a:prstGeom>
+          <a:solidFill>
+            <a:schemeClr val="accent5">
+              <a:lumMod val="50000"/>
+            </a:schemeClr>
+          </a:solidFill>
+          <a:ln>
+            <a:noFill/>
+          </a:ln>
+          <a:effectLst/>
+          <a:scene3d>
+            <a:camera prst="orthographicFront"/>
+            <a:lightRig rig="balanced" dir="t"/>
+          </a:scene3d>
+          <a:sp3d extrusionH="152400" contourW="76200" prstMaterial="plastic">
+            <a:bevelT w="152400" h="152400"/>
+            <a:bevelB w="146050" h="152400" prst="slope"/>
+            <a:contourClr>
+              <a:schemeClr val="bg1"/>
+            </a:contourClr>
+          </a:sp3d>
+        </p:spPr>
+        <p:style>
+          <a:lnRef idx="2">
+            <a:schemeClr val="accent1">
+              <a:shade val="50000"/>
+            </a:schemeClr>
+          </a:lnRef>
+          <a:fillRef idx="1">
+            <a:schemeClr val="accent1"/>
+          </a:fillRef>
+          <a:effectRef idx="0">
+            <a:schemeClr val="accent1"/>
+          </a:effectRef>
+          <a:fontRef idx="minor">
+            <a:schemeClr val="lt1"/>
+          </a:fontRef>
+        </p:style>
+        <p:txBody>
+          <a:bodyPr rtlCol="0" anchor="ctr"/>
+          <a:lstStyle/>
+          <a:p>
+            <a:pPr algn="ctr"/>
+            <a:r>
+              <a:rPr lang="en-US" sz="2400" b="1" dirty="0">
+                <a:latin typeface="Bookman Old Style" panose="02050604050505020204" pitchFamily="18" charset="0"/>
+              </a:rPr>
+              <a:t>Student Feedback – MIS 331</a:t>
+            </a:r>
+          </a:p>
+        </p:txBody>
+      </p:sp>
+      <p:sp>
+        <p:nvSpPr>
+          <p:cNvPr id="10" name="Rounded Rectangle 9">
+            <a:extLst>
+              <a:ext uri="{FF2B5EF4-FFF2-40B4-BE49-F238E27FC236}">
+                <a16:creationId xmlns:a16="http://schemas.microsoft.com/office/drawing/2014/main" id="{AEB6A2E1-830A-CD49-AE54-BE4ADEDA98DF}"/>
+              </a:ext>
+            </a:extLst>
+          </p:cNvPr>
+          <p:cNvSpPr/>
+          <p:nvPr/>
+        </p:nvSpPr>
+        <p:spPr>
+          <a:xfrm>
+            <a:off x="6355245" y="4788842"/>
+            <a:ext cx="6234319" cy="895350"/>
+          </a:xfrm>
+          <a:prstGeom prst="roundRect">
+            <a:avLst/>
+          </a:prstGeom>
+          <a:solidFill>
+            <a:schemeClr val="accent5">
+              <a:lumMod val="50000"/>
+            </a:schemeClr>
+          </a:solidFill>
+          <a:ln>
+            <a:noFill/>
+          </a:ln>
+          <a:effectLst/>
+          <a:scene3d>
+            <a:camera prst="orthographicFront"/>
+            <a:lightRig rig="balanced" dir="t"/>
+          </a:scene3d>
+          <a:sp3d extrusionH="152400" contourW="76200" prstMaterial="plastic">
+            <a:bevelT w="152400" h="152400"/>
+            <a:bevelB w="146050" h="152400" prst="slope"/>
+            <a:contourClr>
+              <a:schemeClr val="bg1"/>
+            </a:contourClr>
+          </a:sp3d>
+        </p:spPr>
+        <p:style>
+          <a:lnRef idx="2">
+            <a:schemeClr val="accent1">
+              <a:shade val="50000"/>
+            </a:schemeClr>
+          </a:lnRef>
+          <a:fillRef idx="1">
+            <a:schemeClr val="accent1"/>
+          </a:fillRef>
+          <a:effectRef idx="0">
+            <a:schemeClr val="accent1"/>
+          </a:effectRef>
+          <a:fontRef idx="minor">
+            <a:schemeClr val="lt1"/>
+          </a:fontRef>
+        </p:style>
+        <p:txBody>
+          <a:bodyPr rtlCol="0" anchor="ctr"/>
+          <a:lstStyle/>
+          <a:p>
+            <a:pPr algn="ctr"/>
+            <a:r>
+              <a:rPr lang="en-US" sz="2400" b="1" dirty="0">
+                <a:latin typeface="Bookman Old Style" panose="02050604050505020204" pitchFamily="18" charset="0"/>
+              </a:rPr>
+              <a:t>Observation letter from a colleague</a:t>
+            </a:r>
+          </a:p>
+        </p:txBody>
+      </p:sp>
+      <p:sp>
+        <p:nvSpPr>
+          <p:cNvPr id="11" name="Rounded Rectangle 10">
+            <a:extLst>
+              <a:ext uri="{FF2B5EF4-FFF2-40B4-BE49-F238E27FC236}">
+                <a16:creationId xmlns:a16="http://schemas.microsoft.com/office/drawing/2014/main" id="{870AA118-76DD-894B-96B5-A7393E6DDB3D}"/>
+              </a:ext>
+            </a:extLst>
+          </p:cNvPr>
+          <p:cNvSpPr/>
+          <p:nvPr/>
+        </p:nvSpPr>
+        <p:spPr>
+          <a:xfrm>
+            <a:off x="-2" y="5962650"/>
+            <a:ext cx="6234319" cy="895350"/>
+          </a:xfrm>
+          <a:prstGeom prst="roundRect">
+            <a:avLst/>
+          </a:prstGeom>
+          <a:solidFill>
+            <a:schemeClr val="accent5">
+              <a:lumMod val="50000"/>
+            </a:schemeClr>
+          </a:solidFill>
+          <a:ln>
+            <a:noFill/>
+          </a:ln>
+          <a:effectLst/>
+          <a:scene3d>
+            <a:camera prst="orthographicFront"/>
+            <a:lightRig rig="balanced" dir="t"/>
+          </a:scene3d>
+          <a:sp3d extrusionH="152400" contourW="76200" prstMaterial="plastic">
+            <a:bevelT w="152400" h="152400"/>
+            <a:bevelB w="146050" h="152400" prst="slope"/>
+            <a:contourClr>
+              <a:schemeClr val="bg1"/>
+            </a:contourClr>
+          </a:sp3d>
+        </p:spPr>
+        <p:style>
+          <a:lnRef idx="2">
+            <a:schemeClr val="accent1">
+              <a:shade val="50000"/>
+            </a:schemeClr>
+          </a:lnRef>
+          <a:fillRef idx="1">
+            <a:schemeClr val="accent1"/>
+          </a:fillRef>
+          <a:effectRef idx="0">
+            <a:schemeClr val="accent1"/>
+          </a:effectRef>
+          <a:fontRef idx="minor">
+            <a:schemeClr val="lt1"/>
+          </a:fontRef>
+        </p:style>
+        <p:txBody>
+          <a:bodyPr rtlCol="0" anchor="ctr"/>
+          <a:lstStyle/>
+          <a:p>
+            <a:pPr algn="ctr"/>
+            <a:r>
+              <a:rPr lang="en-US" sz="2400" b="1" dirty="0">
+                <a:latin typeface="Bookman Old Style" panose="02050604050505020204" pitchFamily="18" charset="0"/>
+              </a:rPr>
+              <a:t>Sample Assignment</a:t>
+            </a:r>
+          </a:p>
+        </p:txBody>
+      </p:sp>
+    </p:spTree>
+    <p:extLst>
+      <p:ext uri="{BB962C8B-B14F-4D97-AF65-F5344CB8AC3E}">
+        <p14:creationId xmlns:p14="http://schemas.microsoft.com/office/powerpoint/2010/main" val="2043955954"/>
       </p:ext>
     </p:extLst>
   </p:cSld>

</xml_diff>

<commit_message>
Updating content in teaching page
Based on comments from peers and instructor in IA 697a course, making updates to the teaching webpage.
</commit_message>
<xml_diff>
--- a/images/teaching_images.pptx
+++ b/images/teaching_images.pptx
@@ -8,6 +8,7 @@
     <p:sldId id="256" r:id="rId2"/>
     <p:sldId id="257" r:id="rId3"/>
     <p:sldId id="258" r:id="rId4"/>
+    <p:sldId id="259" r:id="rId5"/>
   </p:sldIdLst>
   <p:sldSz cx="12192000" cy="6858000"/>
   <p:notesSz cx="6858000" cy="9144000"/>
@@ -261,7 +262,7 @@
           <a:p>
             <a:fld id="{BAD6A051-42DD-104F-BB74-86D577E6163D}" type="datetimeFigureOut">
               <a:rPr lang="en-US" smtClean="0"/>
-              <a:t>10/28/18</a:t>
+              <a:t>12/5/18</a:t>
             </a:fld>
             <a:endParaRPr lang="en-US"/>
           </a:p>
@@ -459,7 +460,7 @@
           <a:p>
             <a:fld id="{BAD6A051-42DD-104F-BB74-86D577E6163D}" type="datetimeFigureOut">
               <a:rPr lang="en-US" smtClean="0"/>
-              <a:t>10/28/18</a:t>
+              <a:t>12/5/18</a:t>
             </a:fld>
             <a:endParaRPr lang="en-US"/>
           </a:p>
@@ -667,7 +668,7 @@
           <a:p>
             <a:fld id="{BAD6A051-42DD-104F-BB74-86D577E6163D}" type="datetimeFigureOut">
               <a:rPr lang="en-US" smtClean="0"/>
-              <a:t>10/28/18</a:t>
+              <a:t>12/5/18</a:t>
             </a:fld>
             <a:endParaRPr lang="en-US"/>
           </a:p>
@@ -865,7 +866,7 @@
           <a:p>
             <a:fld id="{BAD6A051-42DD-104F-BB74-86D577E6163D}" type="datetimeFigureOut">
               <a:rPr lang="en-US" smtClean="0"/>
-              <a:t>10/28/18</a:t>
+              <a:t>12/5/18</a:t>
             </a:fld>
             <a:endParaRPr lang="en-US"/>
           </a:p>
@@ -1140,7 +1141,7 @@
           <a:p>
             <a:fld id="{BAD6A051-42DD-104F-BB74-86D577E6163D}" type="datetimeFigureOut">
               <a:rPr lang="en-US" smtClean="0"/>
-              <a:t>10/28/18</a:t>
+              <a:t>12/5/18</a:t>
             </a:fld>
             <a:endParaRPr lang="en-US"/>
           </a:p>
@@ -1405,7 +1406,7 @@
           <a:p>
             <a:fld id="{BAD6A051-42DD-104F-BB74-86D577E6163D}" type="datetimeFigureOut">
               <a:rPr lang="en-US" smtClean="0"/>
-              <a:t>10/28/18</a:t>
+              <a:t>12/5/18</a:t>
             </a:fld>
             <a:endParaRPr lang="en-US"/>
           </a:p>
@@ -1817,7 +1818,7 @@
           <a:p>
             <a:fld id="{BAD6A051-42DD-104F-BB74-86D577E6163D}" type="datetimeFigureOut">
               <a:rPr lang="en-US" smtClean="0"/>
-              <a:t>10/28/18</a:t>
+              <a:t>12/5/18</a:t>
             </a:fld>
             <a:endParaRPr lang="en-US"/>
           </a:p>
@@ -1958,7 +1959,7 @@
           <a:p>
             <a:fld id="{BAD6A051-42DD-104F-BB74-86D577E6163D}" type="datetimeFigureOut">
               <a:rPr lang="en-US" smtClean="0"/>
-              <a:t>10/28/18</a:t>
+              <a:t>12/5/18</a:t>
             </a:fld>
             <a:endParaRPr lang="en-US"/>
           </a:p>
@@ -2071,7 +2072,7 @@
           <a:p>
             <a:fld id="{BAD6A051-42DD-104F-BB74-86D577E6163D}" type="datetimeFigureOut">
               <a:rPr lang="en-US" smtClean="0"/>
-              <a:t>10/28/18</a:t>
+              <a:t>12/5/18</a:t>
             </a:fld>
             <a:endParaRPr lang="en-US"/>
           </a:p>
@@ -2382,7 +2383,7 @@
           <a:p>
             <a:fld id="{BAD6A051-42DD-104F-BB74-86D577E6163D}" type="datetimeFigureOut">
               <a:rPr lang="en-US" smtClean="0"/>
-              <a:t>10/28/18</a:t>
+              <a:t>12/5/18</a:t>
             </a:fld>
             <a:endParaRPr lang="en-US"/>
           </a:p>
@@ -2670,7 +2671,7 @@
           <a:p>
             <a:fld id="{BAD6A051-42DD-104F-BB74-86D577E6163D}" type="datetimeFigureOut">
               <a:rPr lang="en-US" smtClean="0"/>
-              <a:t>10/28/18</a:t>
+              <a:t>12/5/18</a:t>
             </a:fld>
             <a:endParaRPr lang="en-US"/>
           </a:p>
@@ -2911,7 +2912,7 @@
           <a:p>
             <a:fld id="{BAD6A051-42DD-104F-BB74-86D577E6163D}" type="datetimeFigureOut">
               <a:rPr lang="en-US" smtClean="0"/>
-              <a:t>10/28/18</a:t>
+              <a:t>12/5/18</a:t>
             </a:fld>
             <a:endParaRPr lang="en-US"/>
           </a:p>
@@ -4831,6 +4832,746 @@
 </p:sld>
 </file>
 
+<file path=ppt/slides/slide4.xml><?xml version="1.0" encoding="utf-8"?>
+<p:sld xmlns:a="http://schemas.openxmlformats.org/drawingml/2006/main" xmlns:r="http://schemas.openxmlformats.org/officeDocument/2006/relationships" xmlns:p="http://schemas.openxmlformats.org/presentationml/2006/main">
+  <p:cSld>
+    <p:spTree>
+      <p:nvGrpSpPr>
+        <p:cNvPr id="1" name=""/>
+        <p:cNvGrpSpPr/>
+        <p:nvPr/>
+      </p:nvGrpSpPr>
+      <p:grpSpPr>
+        <a:xfrm>
+          <a:off x="0" y="0"/>
+          <a:ext cx="0" cy="0"/>
+          <a:chOff x="0" y="0"/>
+          <a:chExt cx="0" cy="0"/>
+        </a:xfrm>
+      </p:grpSpPr>
+      <p:sp>
+        <p:nvSpPr>
+          <p:cNvPr id="2" name="Rounded Rectangle 1">
+            <a:extLst>
+              <a:ext uri="{FF2B5EF4-FFF2-40B4-BE49-F238E27FC236}">
+                <a16:creationId xmlns:a16="http://schemas.microsoft.com/office/drawing/2014/main" id="{7045277D-6283-CD4E-B119-18E7631867BD}"/>
+              </a:ext>
+            </a:extLst>
+          </p:cNvPr>
+          <p:cNvSpPr/>
+          <p:nvPr/>
+        </p:nvSpPr>
+        <p:spPr>
+          <a:xfrm>
+            <a:off x="2955238" y="459235"/>
+            <a:ext cx="6234318" cy="895350"/>
+          </a:xfrm>
+          <a:prstGeom prst="roundRect">
+            <a:avLst/>
+          </a:prstGeom>
+          <a:solidFill>
+            <a:schemeClr val="accent5">
+              <a:lumMod val="50000"/>
+            </a:schemeClr>
+          </a:solidFill>
+          <a:ln>
+            <a:noFill/>
+          </a:ln>
+          <a:effectLst/>
+          <a:scene3d>
+            <a:camera prst="orthographicFront"/>
+            <a:lightRig rig="balanced" dir="t"/>
+          </a:scene3d>
+          <a:sp3d extrusionH="152400" contourW="76200" prstMaterial="plastic">
+            <a:bevelT w="152400" h="152400"/>
+            <a:bevelB w="146050" h="152400" prst="slope"/>
+            <a:contourClr>
+              <a:schemeClr val="bg1"/>
+            </a:contourClr>
+          </a:sp3d>
+        </p:spPr>
+        <p:style>
+          <a:lnRef idx="2">
+            <a:schemeClr val="accent1">
+              <a:shade val="50000"/>
+            </a:schemeClr>
+          </a:lnRef>
+          <a:fillRef idx="1">
+            <a:schemeClr val="accent1"/>
+          </a:fillRef>
+          <a:effectRef idx="0">
+            <a:schemeClr val="accent1"/>
+          </a:effectRef>
+          <a:fontRef idx="minor">
+            <a:schemeClr val="lt1"/>
+          </a:fontRef>
+        </p:style>
+        <p:txBody>
+          <a:bodyPr rtlCol="0" anchor="ctr"/>
+          <a:lstStyle/>
+          <a:p>
+            <a:pPr algn="ctr"/>
+            <a:r>
+              <a:rPr lang="en-US" sz="2400" b="1" dirty="0">
+                <a:latin typeface="Bookman Old Style" panose="02050604050505020204" pitchFamily="18" charset="0"/>
+              </a:rPr>
+              <a:t>La Salle Teaching Award</a:t>
+            </a:r>
+          </a:p>
+        </p:txBody>
+      </p:sp>
+      <p:sp>
+        <p:nvSpPr>
+          <p:cNvPr id="3" name="Rounded Rectangle 2">
+            <a:extLst>
+              <a:ext uri="{FF2B5EF4-FFF2-40B4-BE49-F238E27FC236}">
+                <a16:creationId xmlns:a16="http://schemas.microsoft.com/office/drawing/2014/main" id="{0C73FB99-7074-7542-8DE9-98535F6163D5}"/>
+              </a:ext>
+            </a:extLst>
+          </p:cNvPr>
+          <p:cNvSpPr/>
+          <p:nvPr/>
+        </p:nvSpPr>
+        <p:spPr>
+          <a:xfrm>
+            <a:off x="2" y="1555600"/>
+            <a:ext cx="6234319" cy="895350"/>
+          </a:xfrm>
+          <a:prstGeom prst="roundRect">
+            <a:avLst/>
+          </a:prstGeom>
+          <a:solidFill>
+            <a:schemeClr val="accent5">
+              <a:lumMod val="50000"/>
+            </a:schemeClr>
+          </a:solidFill>
+          <a:ln>
+            <a:noFill/>
+          </a:ln>
+          <a:effectLst/>
+          <a:scene3d>
+            <a:camera prst="orthographicFront"/>
+            <a:lightRig rig="balanced" dir="t"/>
+          </a:scene3d>
+          <a:sp3d extrusionH="152400" contourW="76200" prstMaterial="plastic">
+            <a:bevelT w="152400" h="152400"/>
+            <a:bevelB w="146050" h="152400" prst="slope"/>
+            <a:contourClr>
+              <a:schemeClr val="bg1"/>
+            </a:contourClr>
+          </a:sp3d>
+        </p:spPr>
+        <p:style>
+          <a:lnRef idx="2">
+            <a:schemeClr val="accent1">
+              <a:shade val="50000"/>
+            </a:schemeClr>
+          </a:lnRef>
+          <a:fillRef idx="1">
+            <a:schemeClr val="accent1"/>
+          </a:fillRef>
+          <a:effectRef idx="0">
+            <a:schemeClr val="accent1"/>
+          </a:effectRef>
+          <a:fontRef idx="minor">
+            <a:schemeClr val="lt1"/>
+          </a:fontRef>
+        </p:style>
+        <p:txBody>
+          <a:bodyPr rtlCol="0" anchor="ctr"/>
+          <a:lstStyle/>
+          <a:p>
+            <a:pPr algn="ctr"/>
+            <a:r>
+              <a:rPr lang="en-US" sz="2400" b="1" dirty="0">
+                <a:latin typeface="Bookman Old Style" panose="02050604050505020204" pitchFamily="18" charset="0"/>
+              </a:rPr>
+              <a:t>Sample Syllabus</a:t>
+            </a:r>
+          </a:p>
+        </p:txBody>
+      </p:sp>
+      <p:sp>
+        <p:nvSpPr>
+          <p:cNvPr id="4" name="Rounded Rectangle 3">
+            <a:extLst>
+              <a:ext uri="{FF2B5EF4-FFF2-40B4-BE49-F238E27FC236}">
+                <a16:creationId xmlns:a16="http://schemas.microsoft.com/office/drawing/2014/main" id="{ECA4CF57-5DEB-3F46-9724-D5D572FA6FC3}"/>
+              </a:ext>
+            </a:extLst>
+          </p:cNvPr>
+          <p:cNvSpPr/>
+          <p:nvPr/>
+        </p:nvSpPr>
+        <p:spPr>
+          <a:xfrm>
+            <a:off x="6355245" y="1554070"/>
+            <a:ext cx="6234319" cy="895350"/>
+          </a:xfrm>
+          <a:prstGeom prst="roundRect">
+            <a:avLst/>
+          </a:prstGeom>
+          <a:solidFill>
+            <a:schemeClr val="accent5">
+              <a:lumMod val="50000"/>
+            </a:schemeClr>
+          </a:solidFill>
+          <a:ln>
+            <a:noFill/>
+          </a:ln>
+          <a:effectLst/>
+          <a:scene3d>
+            <a:camera prst="orthographicFront"/>
+            <a:lightRig rig="balanced" dir="t"/>
+          </a:scene3d>
+          <a:sp3d extrusionH="152400" contourW="76200" prstMaterial="plastic">
+            <a:bevelT w="152400" h="152400"/>
+            <a:bevelB w="146050" h="152400" prst="slope"/>
+            <a:contourClr>
+              <a:schemeClr val="bg1"/>
+            </a:contourClr>
+          </a:sp3d>
+        </p:spPr>
+        <p:style>
+          <a:lnRef idx="2">
+            <a:schemeClr val="accent1">
+              <a:shade val="50000"/>
+            </a:schemeClr>
+          </a:lnRef>
+          <a:fillRef idx="1">
+            <a:schemeClr val="accent1"/>
+          </a:fillRef>
+          <a:effectRef idx="0">
+            <a:schemeClr val="accent1"/>
+          </a:effectRef>
+          <a:fontRef idx="minor">
+            <a:schemeClr val="lt1"/>
+          </a:fontRef>
+        </p:style>
+        <p:txBody>
+          <a:bodyPr rtlCol="0" anchor="ctr"/>
+          <a:lstStyle/>
+          <a:p>
+            <a:pPr algn="ctr"/>
+            <a:r>
+              <a:rPr lang="en-US" sz="2400" b="1" dirty="0">
+                <a:latin typeface="Bookman Old Style" panose="02050604050505020204" pitchFamily="18" charset="0"/>
+              </a:rPr>
+              <a:t>Teaching Sample (Video)</a:t>
+            </a:r>
+          </a:p>
+        </p:txBody>
+      </p:sp>
+      <p:sp>
+        <p:nvSpPr>
+          <p:cNvPr id="5" name="Rounded Rectangle 4">
+            <a:extLst>
+              <a:ext uri="{FF2B5EF4-FFF2-40B4-BE49-F238E27FC236}">
+                <a16:creationId xmlns:a16="http://schemas.microsoft.com/office/drawing/2014/main" id="{372C7A05-DE50-094F-AA1D-AB8F12C472F9}"/>
+              </a:ext>
+            </a:extLst>
+          </p:cNvPr>
+          <p:cNvSpPr/>
+          <p:nvPr/>
+        </p:nvSpPr>
+        <p:spPr>
+          <a:xfrm>
+            <a:off x="1" y="2624759"/>
+            <a:ext cx="6234319" cy="895350"/>
+          </a:xfrm>
+          <a:prstGeom prst="roundRect">
+            <a:avLst/>
+          </a:prstGeom>
+          <a:solidFill>
+            <a:schemeClr val="accent5">
+              <a:lumMod val="50000"/>
+            </a:schemeClr>
+          </a:solidFill>
+          <a:ln>
+            <a:noFill/>
+          </a:ln>
+          <a:effectLst/>
+          <a:scene3d>
+            <a:camera prst="orthographicFront"/>
+            <a:lightRig rig="balanced" dir="t"/>
+          </a:scene3d>
+          <a:sp3d extrusionH="152400" contourW="76200" prstMaterial="plastic">
+            <a:bevelT w="152400" h="152400"/>
+            <a:bevelB w="146050" h="152400" prst="slope"/>
+            <a:contourClr>
+              <a:schemeClr val="bg1"/>
+            </a:contourClr>
+          </a:sp3d>
+        </p:spPr>
+        <p:style>
+          <a:lnRef idx="2">
+            <a:schemeClr val="accent1">
+              <a:shade val="50000"/>
+            </a:schemeClr>
+          </a:lnRef>
+          <a:fillRef idx="1">
+            <a:schemeClr val="accent1"/>
+          </a:fillRef>
+          <a:effectRef idx="0">
+            <a:schemeClr val="accent1"/>
+          </a:effectRef>
+          <a:fontRef idx="minor">
+            <a:schemeClr val="lt1"/>
+          </a:fontRef>
+        </p:style>
+        <p:txBody>
+          <a:bodyPr rtlCol="0" anchor="ctr"/>
+          <a:lstStyle/>
+          <a:p>
+            <a:pPr algn="ctr"/>
+            <a:r>
+              <a:rPr lang="en-US" sz="2400" b="1" dirty="0">
+                <a:latin typeface="Bookman Old Style" panose="02050604050505020204" pitchFamily="18" charset="0"/>
+              </a:rPr>
+              <a:t>Sample Lesson Plan</a:t>
+            </a:r>
+          </a:p>
+        </p:txBody>
+      </p:sp>
+      <p:sp>
+        <p:nvSpPr>
+          <p:cNvPr id="6" name="Rounded Rectangle 5">
+            <a:extLst>
+              <a:ext uri="{FF2B5EF4-FFF2-40B4-BE49-F238E27FC236}">
+                <a16:creationId xmlns:a16="http://schemas.microsoft.com/office/drawing/2014/main" id="{D9E62570-D51E-DF46-8B44-DF0BAB4E3470}"/>
+              </a:ext>
+            </a:extLst>
+          </p:cNvPr>
+          <p:cNvSpPr/>
+          <p:nvPr/>
+        </p:nvSpPr>
+        <p:spPr>
+          <a:xfrm>
+            <a:off x="-1" y="3741219"/>
+            <a:ext cx="6234319" cy="895350"/>
+          </a:xfrm>
+          <a:prstGeom prst="roundRect">
+            <a:avLst/>
+          </a:prstGeom>
+          <a:solidFill>
+            <a:schemeClr val="accent5">
+              <a:lumMod val="50000"/>
+            </a:schemeClr>
+          </a:solidFill>
+          <a:ln>
+            <a:noFill/>
+          </a:ln>
+          <a:effectLst/>
+          <a:scene3d>
+            <a:camera prst="orthographicFront"/>
+            <a:lightRig rig="balanced" dir="t"/>
+          </a:scene3d>
+          <a:sp3d extrusionH="152400" contourW="76200" prstMaterial="plastic">
+            <a:bevelT w="152400" h="152400"/>
+            <a:bevelB w="146050" h="152400" prst="slope"/>
+            <a:contourClr>
+              <a:schemeClr val="bg1"/>
+            </a:contourClr>
+          </a:sp3d>
+        </p:spPr>
+        <p:style>
+          <a:lnRef idx="2">
+            <a:schemeClr val="accent1">
+              <a:shade val="50000"/>
+            </a:schemeClr>
+          </a:lnRef>
+          <a:fillRef idx="1">
+            <a:schemeClr val="accent1"/>
+          </a:fillRef>
+          <a:effectRef idx="0">
+            <a:schemeClr val="accent1"/>
+          </a:effectRef>
+          <a:fontRef idx="minor">
+            <a:schemeClr val="lt1"/>
+          </a:fontRef>
+        </p:style>
+        <p:txBody>
+          <a:bodyPr rtlCol="0" anchor="ctr"/>
+          <a:lstStyle/>
+          <a:p>
+            <a:pPr algn="ctr"/>
+            <a:r>
+              <a:rPr lang="en-US" sz="2400" b="1" dirty="0">
+                <a:latin typeface="Bookman Old Style" panose="02050604050505020204" pitchFamily="18" charset="0"/>
+              </a:rPr>
+              <a:t>Sample Assignment Feedback </a:t>
+            </a:r>
+          </a:p>
+        </p:txBody>
+      </p:sp>
+      <p:sp>
+        <p:nvSpPr>
+          <p:cNvPr id="7" name="Rounded Rectangle 6">
+            <a:extLst>
+              <a:ext uri="{FF2B5EF4-FFF2-40B4-BE49-F238E27FC236}">
+                <a16:creationId xmlns:a16="http://schemas.microsoft.com/office/drawing/2014/main" id="{542DDDEF-4997-9840-AABA-1C8FA05A5AC3}"/>
+              </a:ext>
+            </a:extLst>
+          </p:cNvPr>
+          <p:cNvSpPr/>
+          <p:nvPr/>
+        </p:nvSpPr>
+        <p:spPr>
+          <a:xfrm>
+            <a:off x="0" y="4811368"/>
+            <a:ext cx="6234319" cy="895350"/>
+          </a:xfrm>
+          <a:prstGeom prst="roundRect">
+            <a:avLst/>
+          </a:prstGeom>
+          <a:solidFill>
+            <a:schemeClr val="accent5">
+              <a:lumMod val="50000"/>
+            </a:schemeClr>
+          </a:solidFill>
+          <a:ln>
+            <a:noFill/>
+          </a:ln>
+          <a:effectLst/>
+          <a:scene3d>
+            <a:camera prst="orthographicFront"/>
+            <a:lightRig rig="balanced" dir="t"/>
+          </a:scene3d>
+          <a:sp3d extrusionH="152400" contourW="76200" prstMaterial="plastic">
+            <a:bevelT w="152400" h="152400"/>
+            <a:bevelB w="146050" h="152400" prst="slope"/>
+            <a:contourClr>
+              <a:schemeClr val="bg1"/>
+            </a:contourClr>
+          </a:sp3d>
+        </p:spPr>
+        <p:style>
+          <a:lnRef idx="2">
+            <a:schemeClr val="accent1">
+              <a:shade val="50000"/>
+            </a:schemeClr>
+          </a:lnRef>
+          <a:fillRef idx="1">
+            <a:schemeClr val="accent1"/>
+          </a:fillRef>
+          <a:effectRef idx="0">
+            <a:schemeClr val="accent1"/>
+          </a:effectRef>
+          <a:fontRef idx="minor">
+            <a:schemeClr val="lt1"/>
+          </a:fontRef>
+        </p:style>
+        <p:txBody>
+          <a:bodyPr rtlCol="0" anchor="ctr"/>
+          <a:lstStyle/>
+          <a:p>
+            <a:pPr algn="ctr"/>
+            <a:r>
+              <a:rPr lang="en-US" sz="2400" b="1" dirty="0">
+                <a:latin typeface="Bookman Old Style" panose="02050604050505020204" pitchFamily="18" charset="0"/>
+              </a:rPr>
+              <a:t>Sample Assessment Rubric</a:t>
+            </a:r>
+          </a:p>
+        </p:txBody>
+      </p:sp>
+      <p:sp>
+        <p:nvSpPr>
+          <p:cNvPr id="8" name="Rounded Rectangle 7">
+            <a:extLst>
+              <a:ext uri="{FF2B5EF4-FFF2-40B4-BE49-F238E27FC236}">
+                <a16:creationId xmlns:a16="http://schemas.microsoft.com/office/drawing/2014/main" id="{2CF3EBE6-AB75-3344-B3D1-3AEFE518F373}"/>
+              </a:ext>
+            </a:extLst>
+          </p:cNvPr>
+          <p:cNvSpPr/>
+          <p:nvPr/>
+        </p:nvSpPr>
+        <p:spPr>
+          <a:xfrm>
+            <a:off x="6355246" y="2673050"/>
+            <a:ext cx="6234319" cy="895350"/>
+          </a:xfrm>
+          <a:prstGeom prst="roundRect">
+            <a:avLst/>
+          </a:prstGeom>
+          <a:solidFill>
+            <a:schemeClr val="accent5">
+              <a:lumMod val="50000"/>
+            </a:schemeClr>
+          </a:solidFill>
+          <a:ln>
+            <a:noFill/>
+          </a:ln>
+          <a:effectLst/>
+          <a:scene3d>
+            <a:camera prst="orthographicFront"/>
+            <a:lightRig rig="balanced" dir="t"/>
+          </a:scene3d>
+          <a:sp3d extrusionH="152400" contourW="76200" prstMaterial="plastic">
+            <a:bevelT w="152400" h="152400"/>
+            <a:bevelB w="146050" h="152400" prst="slope"/>
+            <a:contourClr>
+              <a:schemeClr val="bg1"/>
+            </a:contourClr>
+          </a:sp3d>
+        </p:spPr>
+        <p:style>
+          <a:lnRef idx="2">
+            <a:schemeClr val="accent1">
+              <a:shade val="50000"/>
+            </a:schemeClr>
+          </a:lnRef>
+          <a:fillRef idx="1">
+            <a:schemeClr val="accent1"/>
+          </a:fillRef>
+          <a:effectRef idx="0">
+            <a:schemeClr val="accent1"/>
+          </a:effectRef>
+          <a:fontRef idx="minor">
+            <a:schemeClr val="lt1"/>
+          </a:fontRef>
+        </p:style>
+        <p:txBody>
+          <a:bodyPr rtlCol="0" anchor="ctr"/>
+          <a:lstStyle/>
+          <a:p>
+            <a:pPr algn="ctr"/>
+            <a:r>
+              <a:rPr lang="en-US" sz="2400" b="1" dirty="0">
+                <a:latin typeface="Bookman Old Style" panose="02050604050505020204" pitchFamily="18" charset="0"/>
+              </a:rPr>
+              <a:t>Student Feedback – MIS 111</a:t>
+            </a:r>
+          </a:p>
+        </p:txBody>
+      </p:sp>
+      <p:sp>
+        <p:nvSpPr>
+          <p:cNvPr id="9" name="Rounded Rectangle 8">
+            <a:extLst>
+              <a:ext uri="{FF2B5EF4-FFF2-40B4-BE49-F238E27FC236}">
+                <a16:creationId xmlns:a16="http://schemas.microsoft.com/office/drawing/2014/main" id="{3DB02658-814B-314E-9A70-FE7D335BD20D}"/>
+              </a:ext>
+            </a:extLst>
+          </p:cNvPr>
+          <p:cNvSpPr/>
+          <p:nvPr/>
+        </p:nvSpPr>
+        <p:spPr>
+          <a:xfrm>
+            <a:off x="6355245" y="3669862"/>
+            <a:ext cx="6234319" cy="895350"/>
+          </a:xfrm>
+          <a:prstGeom prst="roundRect">
+            <a:avLst/>
+          </a:prstGeom>
+          <a:solidFill>
+            <a:schemeClr val="accent5">
+              <a:lumMod val="50000"/>
+            </a:schemeClr>
+          </a:solidFill>
+          <a:ln>
+            <a:noFill/>
+          </a:ln>
+          <a:effectLst/>
+          <a:scene3d>
+            <a:camera prst="orthographicFront"/>
+            <a:lightRig rig="balanced" dir="t"/>
+          </a:scene3d>
+          <a:sp3d extrusionH="152400" contourW="76200" prstMaterial="plastic">
+            <a:bevelT w="152400" h="152400"/>
+            <a:bevelB w="146050" h="152400" prst="slope"/>
+            <a:contourClr>
+              <a:schemeClr val="bg1"/>
+            </a:contourClr>
+          </a:sp3d>
+        </p:spPr>
+        <p:style>
+          <a:lnRef idx="2">
+            <a:schemeClr val="accent1">
+              <a:shade val="50000"/>
+            </a:schemeClr>
+          </a:lnRef>
+          <a:fillRef idx="1">
+            <a:schemeClr val="accent1"/>
+          </a:fillRef>
+          <a:effectRef idx="0">
+            <a:schemeClr val="accent1"/>
+          </a:effectRef>
+          <a:fontRef idx="minor">
+            <a:schemeClr val="lt1"/>
+          </a:fontRef>
+        </p:style>
+        <p:txBody>
+          <a:bodyPr rtlCol="0" anchor="ctr"/>
+          <a:lstStyle/>
+          <a:p>
+            <a:pPr algn="ctr"/>
+            <a:r>
+              <a:rPr lang="en-US" sz="2400" b="1" dirty="0">
+                <a:latin typeface="Bookman Old Style" panose="02050604050505020204" pitchFamily="18" charset="0"/>
+              </a:rPr>
+              <a:t>Student Feedback – MIS 331</a:t>
+            </a:r>
+          </a:p>
+        </p:txBody>
+      </p:sp>
+      <p:sp>
+        <p:nvSpPr>
+          <p:cNvPr id="10" name="Rounded Rectangle 9">
+            <a:extLst>
+              <a:ext uri="{FF2B5EF4-FFF2-40B4-BE49-F238E27FC236}">
+                <a16:creationId xmlns:a16="http://schemas.microsoft.com/office/drawing/2014/main" id="{AEB6A2E1-830A-CD49-AE54-BE4ADEDA98DF}"/>
+              </a:ext>
+            </a:extLst>
+          </p:cNvPr>
+          <p:cNvSpPr/>
+          <p:nvPr/>
+        </p:nvSpPr>
+        <p:spPr>
+          <a:xfrm>
+            <a:off x="6355245" y="4788842"/>
+            <a:ext cx="6234319" cy="895350"/>
+          </a:xfrm>
+          <a:prstGeom prst="roundRect">
+            <a:avLst/>
+          </a:prstGeom>
+          <a:solidFill>
+            <a:schemeClr val="accent5">
+              <a:lumMod val="50000"/>
+            </a:schemeClr>
+          </a:solidFill>
+          <a:ln>
+            <a:noFill/>
+          </a:ln>
+          <a:effectLst/>
+          <a:scene3d>
+            <a:camera prst="orthographicFront"/>
+            <a:lightRig rig="balanced" dir="t"/>
+          </a:scene3d>
+          <a:sp3d extrusionH="152400" contourW="76200" prstMaterial="plastic">
+            <a:bevelT w="152400" h="152400"/>
+            <a:bevelB w="146050" h="152400" prst="slope"/>
+            <a:contourClr>
+              <a:schemeClr val="bg1"/>
+            </a:contourClr>
+          </a:sp3d>
+        </p:spPr>
+        <p:style>
+          <a:lnRef idx="2">
+            <a:schemeClr val="accent1">
+              <a:shade val="50000"/>
+            </a:schemeClr>
+          </a:lnRef>
+          <a:fillRef idx="1">
+            <a:schemeClr val="accent1"/>
+          </a:fillRef>
+          <a:effectRef idx="0">
+            <a:schemeClr val="accent1"/>
+          </a:effectRef>
+          <a:fontRef idx="minor">
+            <a:schemeClr val="lt1"/>
+          </a:fontRef>
+        </p:style>
+        <p:txBody>
+          <a:bodyPr rtlCol="0" anchor="ctr"/>
+          <a:lstStyle/>
+          <a:p>
+            <a:pPr algn="ctr"/>
+            <a:r>
+              <a:rPr lang="en-US" sz="2400" b="1" dirty="0">
+                <a:latin typeface="Bookman Old Style" panose="02050604050505020204" pitchFamily="18" charset="0"/>
+              </a:rPr>
+              <a:t>Observation letter from a colleague</a:t>
+            </a:r>
+          </a:p>
+        </p:txBody>
+      </p:sp>
+      <p:sp>
+        <p:nvSpPr>
+          <p:cNvPr id="11" name="Rounded Rectangle 10">
+            <a:extLst>
+              <a:ext uri="{FF2B5EF4-FFF2-40B4-BE49-F238E27FC236}">
+                <a16:creationId xmlns:a16="http://schemas.microsoft.com/office/drawing/2014/main" id="{870AA118-76DD-894B-96B5-A7393E6DDB3D}"/>
+              </a:ext>
+            </a:extLst>
+          </p:cNvPr>
+          <p:cNvSpPr/>
+          <p:nvPr/>
+        </p:nvSpPr>
+        <p:spPr>
+          <a:xfrm>
+            <a:off x="-2" y="5962650"/>
+            <a:ext cx="6234319" cy="895350"/>
+          </a:xfrm>
+          <a:prstGeom prst="roundRect">
+            <a:avLst/>
+          </a:prstGeom>
+          <a:solidFill>
+            <a:schemeClr val="accent5">
+              <a:lumMod val="50000"/>
+            </a:schemeClr>
+          </a:solidFill>
+          <a:ln>
+            <a:noFill/>
+          </a:ln>
+          <a:effectLst/>
+          <a:scene3d>
+            <a:camera prst="orthographicFront"/>
+            <a:lightRig rig="balanced" dir="t"/>
+          </a:scene3d>
+          <a:sp3d extrusionH="152400" contourW="76200" prstMaterial="plastic">
+            <a:bevelT w="152400" h="152400"/>
+            <a:bevelB w="146050" h="152400" prst="slope"/>
+            <a:contourClr>
+              <a:schemeClr val="bg1"/>
+            </a:contourClr>
+          </a:sp3d>
+        </p:spPr>
+        <p:style>
+          <a:lnRef idx="2">
+            <a:schemeClr val="accent1">
+              <a:shade val="50000"/>
+            </a:schemeClr>
+          </a:lnRef>
+          <a:fillRef idx="1">
+            <a:schemeClr val="accent1"/>
+          </a:fillRef>
+          <a:effectRef idx="0">
+            <a:schemeClr val="accent1"/>
+          </a:effectRef>
+          <a:fontRef idx="minor">
+            <a:schemeClr val="lt1"/>
+          </a:fontRef>
+        </p:style>
+        <p:txBody>
+          <a:bodyPr rtlCol="0" anchor="ctr"/>
+          <a:lstStyle/>
+          <a:p>
+            <a:pPr algn="ctr"/>
+            <a:r>
+              <a:rPr lang="en-US" sz="2400" b="1" dirty="0">
+                <a:latin typeface="Bookman Old Style" panose="02050604050505020204" pitchFamily="18" charset="0"/>
+              </a:rPr>
+              <a:t>Sample Assignment</a:t>
+            </a:r>
+          </a:p>
+        </p:txBody>
+      </p:sp>
+    </p:spTree>
+    <p:extLst>
+      <p:ext uri="{BB962C8B-B14F-4D97-AF65-F5344CB8AC3E}">
+        <p14:creationId xmlns:p14="http://schemas.microsoft.com/office/powerpoint/2010/main" val="2714152546"/>
+      </p:ext>
+    </p:extLst>
+  </p:cSld>
+  <p:clrMapOvr>
+    <a:masterClrMapping/>
+  </p:clrMapOvr>
+</p:sld>
+</file>
+
 <file path=ppt/theme/theme1.xml><?xml version="1.0" encoding="utf-8"?>
 <a:theme xmlns:a="http://schemas.openxmlformats.org/drawingml/2006/main" name="Office Theme">
   <a:themeElements>

</xml_diff>

<commit_message>
Update student feedback as image
</commit_message>
<xml_diff>
--- a/images/teaching_images.pptx
+++ b/images/teaching_images.pptx
@@ -9,6 +9,7 @@
     <p:sldId id="257" r:id="rId3"/>
     <p:sldId id="258" r:id="rId4"/>
     <p:sldId id="259" r:id="rId5"/>
+    <p:sldId id="260" r:id="rId6"/>
   </p:sldIdLst>
   <p:sldSz cx="12192000" cy="6858000"/>
   <p:notesSz cx="6858000" cy="9144000"/>
@@ -5572,6 +5573,103 @@
 </p:sld>
 </file>
 
+<file path=ppt/slides/slide5.xml><?xml version="1.0" encoding="utf-8"?>
+<p:sld xmlns:a="http://schemas.openxmlformats.org/drawingml/2006/main" xmlns:r="http://schemas.openxmlformats.org/officeDocument/2006/relationships" xmlns:p="http://schemas.openxmlformats.org/presentationml/2006/main">
+  <p:cSld>
+    <p:spTree>
+      <p:nvGrpSpPr>
+        <p:cNvPr id="1" name=""/>
+        <p:cNvGrpSpPr/>
+        <p:nvPr/>
+      </p:nvGrpSpPr>
+      <p:grpSpPr>
+        <a:xfrm>
+          <a:off x="0" y="0"/>
+          <a:ext cx="0" cy="0"/>
+          <a:chOff x="0" y="0"/>
+          <a:chExt cx="0" cy="0"/>
+        </a:xfrm>
+      </p:grpSpPr>
+      <p:sp>
+        <p:nvSpPr>
+          <p:cNvPr id="2" name="TextBox 1">
+            <a:extLst>
+              <a:ext uri="{FF2B5EF4-FFF2-40B4-BE49-F238E27FC236}">
+                <a16:creationId xmlns:a16="http://schemas.microsoft.com/office/drawing/2014/main" id="{0762F1B3-7B85-FB48-A45F-6152B472423E}"/>
+              </a:ext>
+            </a:extLst>
+          </p:cNvPr>
+          <p:cNvSpPr txBox="1"/>
+          <p:nvPr/>
+        </p:nvSpPr>
+        <p:spPr>
+          <a:xfrm>
+            <a:off x="1451113" y="2703443"/>
+            <a:ext cx="9243390" cy="1736646"/>
+          </a:xfrm>
+          <a:prstGeom prst="roundRect">
+            <a:avLst/>
+          </a:prstGeom>
+          <a:solidFill>
+            <a:schemeClr val="bg1"/>
+          </a:solidFill>
+          <a:ln>
+            <a:solidFill>
+              <a:schemeClr val="tx1"/>
+            </a:solidFill>
+          </a:ln>
+          <a:effectLst>
+            <a:outerShdw blurRad="50800" dist="355600" dir="2040000" algn="tl" rotWithShape="0">
+              <a:schemeClr val="tx1">
+                <a:alpha val="40000"/>
+              </a:schemeClr>
+            </a:outerShdw>
+          </a:effectLst>
+        </p:spPr>
+        <p:txBody>
+          <a:bodyPr wrap="square" rtlCol="0">
+            <a:spAutoFit/>
+          </a:bodyPr>
+          <a:lstStyle/>
+          <a:p>
+            <a:pPr algn="ctr"/>
+            <a:r>
+              <a:rPr lang="en-US" sz="2400" b="1" dirty="0">
+                <a:latin typeface="Apple Chancery" panose="03020702040506060504" pitchFamily="66" charset="-79"/>
+                <a:cs typeface="Apple Chancery" panose="03020702040506060504" pitchFamily="66" charset="-79"/>
+              </a:rPr>
+              <a:t>The instructor brought to the classroom a lot of passion for the material, an unusual characteristic for professors. The instructor always made sure students understood the material and was flexible in helping them when they needed help</a:t>
+            </a:r>
+            <a:r>
+              <a:rPr lang="en-US" b="1" dirty="0">
+                <a:latin typeface="Apple Chancery" panose="03020702040506060504" pitchFamily="66" charset="-79"/>
+                <a:cs typeface="Apple Chancery" panose="03020702040506060504" pitchFamily="66" charset="-79"/>
+              </a:rPr>
+              <a:t> </a:t>
+            </a:r>
+            <a:r>
+              <a:rPr lang="en-US" dirty="0">
+                <a:latin typeface="Apple Chancery" panose="03020702040506060504" pitchFamily="66" charset="-79"/>
+                <a:cs typeface="Apple Chancery" panose="03020702040506060504" pitchFamily="66" charset="-79"/>
+              </a:rPr>
+              <a:t>– Anonymous student feedback</a:t>
+            </a:r>
+          </a:p>
+        </p:txBody>
+      </p:sp>
+    </p:spTree>
+    <p:extLst>
+      <p:ext uri="{BB962C8B-B14F-4D97-AF65-F5344CB8AC3E}">
+        <p14:creationId xmlns:p14="http://schemas.microsoft.com/office/powerpoint/2010/main" val="108538560"/>
+      </p:ext>
+    </p:extLst>
+  </p:cSld>
+  <p:clrMapOvr>
+    <a:masterClrMapping/>
+  </p:clrMapOvr>
+</p:sld>
+</file>
+
 <file path=ppt/theme/theme1.xml><?xml version="1.0" encoding="utf-8"?>
 <a:theme xmlns:a="http://schemas.openxmlformats.org/drawingml/2006/main" name="Office Theme">
   <a:themeElements>

</xml_diff>

<commit_message>
Uploaded google cloud verification file
This is to verify karanalytics.com to google.
</commit_message>
<xml_diff>
--- a/images/teaching_images.pptx
+++ b/images/teaching_images.pptx
@@ -5604,8 +5604,8 @@
         </p:nvSpPr>
         <p:spPr>
           <a:xfrm>
-            <a:off x="1451113" y="2703443"/>
-            <a:ext cx="9243390" cy="1736646"/>
+            <a:off x="894520" y="3160642"/>
+            <a:ext cx="9939131" cy="2145268"/>
           </a:xfrm>
           <a:prstGeom prst="roundRect">
             <a:avLst/>
@@ -5635,21 +5635,21 @@
             <a:pPr algn="ctr"/>
             <a:r>
               <a:rPr lang="en-US" sz="2400" b="1" dirty="0">
-                <a:latin typeface="Apple Chancery" panose="03020702040506060504" pitchFamily="66" charset="-79"/>
+                <a:latin typeface="Bookman Old Style" panose="02050604050505020204" pitchFamily="18" charset="0"/>
                 <a:cs typeface="Apple Chancery" panose="03020702040506060504" pitchFamily="66" charset="-79"/>
               </a:rPr>
               <a:t>The instructor brought to the classroom a lot of passion for the material, an unusual characteristic for professors. The instructor always made sure students understood the material and was flexible in helping them when they needed help</a:t>
             </a:r>
             <a:r>
               <a:rPr lang="en-US" b="1" dirty="0">
-                <a:latin typeface="Apple Chancery" panose="03020702040506060504" pitchFamily="66" charset="-79"/>
+                <a:latin typeface="Bookman Old Style" panose="02050604050505020204" pitchFamily="18" charset="0"/>
                 <a:cs typeface="Apple Chancery" panose="03020702040506060504" pitchFamily="66" charset="-79"/>
               </a:rPr>
               <a:t> </a:t>
             </a:r>
             <a:r>
               <a:rPr lang="en-US" dirty="0">
-                <a:latin typeface="Apple Chancery" panose="03020702040506060504" pitchFamily="66" charset="-79"/>
+                <a:latin typeface="Bookman Old Style" panose="02050604050505020204" pitchFamily="18" charset="0"/>
                 <a:cs typeface="Apple Chancery" panose="03020702040506060504" pitchFamily="66" charset="-79"/>
               </a:rPr>
               <a:t>– Anonymous student feedback</a:t>

</xml_diff>